<commit_message>
Update Final TS Project Presentation.pptx
</commit_message>
<xml_diff>
--- a/PPT_Files/Final TS Project Presentation.pptx
+++ b/PPT_Files/Final TS Project Presentation.pptx
@@ -7404,15 +7404,15 @@
         </p:nvSpPr>
         <p:spPr>
           <a:xfrm>
-            <a:off x="1751206" y="1184307"/>
-            <a:ext cx="6728124" cy="2308324"/>
+            <a:off x="374350" y="1426045"/>
+            <a:ext cx="10598449" cy="2585323"/>
           </a:xfrm>
           <a:prstGeom prst="rect">
             <a:avLst/>
           </a:prstGeom>
         </p:spPr>
         <p:txBody>
-          <a:bodyPr wrap="none">
+          <a:bodyPr wrap="square">
             <a:spAutoFit/>
           </a:bodyPr>
           <a:lstStyle/>
@@ -7446,14 +7446,43 @@
             </a:pPr>
             <a:r>
               <a:rPr lang="en-US" dirty="0"/>
-              <a:t>RMD File</a:t>
-            </a:r>
-          </a:p>
-          <a:p>
-            <a:pPr marL="742950" lvl="1" indent="-285750">
-              <a:buFont typeface="Arial" panose="020B0604020202020204" pitchFamily="34" charset="0"/>
-              <a:buChar char="•"/>
-            </a:pPr>
+              <a:t>Knit HTML File</a:t>
+            </a:r>
+          </a:p>
+          <a:p>
+            <a:pPr lvl="1" fontAlgn="base"/>
+            <a:r>
+              <a:rPr lang="en-US" dirty="0"/>
+              <a:t>https://</a:t>
+            </a:r>
+            <a:r>
+              <a:rPr lang="en-US" dirty="0" err="1"/>
+              <a:t>github.com</a:t>
+            </a:r>
+            <a:r>
+              <a:rPr lang="en-US" dirty="0"/>
+              <a:t>/C-Stewart-GH/</a:t>
+            </a:r>
+            <a:r>
+              <a:rPr lang="en-US" dirty="0" err="1"/>
+              <a:t>Time_Series_Project</a:t>
+            </a:r>
+            <a:r>
+              <a:rPr lang="en-US" dirty="0"/>
+              <a:t>/blob/main/</a:t>
+            </a:r>
+            <a:r>
+              <a:rPr lang="en-US" dirty="0" err="1"/>
+              <a:t>RMD_Files</a:t>
+            </a:r>
+            <a:r>
+              <a:rPr lang="en-US" dirty="0"/>
+              <a:t>/</a:t>
+            </a:r>
+            <a:r>
+              <a:rPr lang="en-US" dirty="0" err="1"/>
+              <a:t>Final_TS_Project.html</a:t>
+            </a:r>
             <a:endParaRPr lang="en-US" dirty="0"/>
           </a:p>
           <a:p>

</xml_diff>